<commit_message>
Manuscrito y mapa de la unidad 08 décimo
actualizados
</commit_message>
<xml_diff>
--- a/fuentes/contenidos/grado10/guion08/Mapa_CS_10_08_CO.pptx
+++ b/fuentes/contenidos/grado10/guion08/Mapa_CS_10_08_CO.pptx
@@ -450,7 +450,7 @@
           <a:p>
             <a:fld id="{5001C876-01F7-4317-94B9-1AE222133113}" type="datetimeFigureOut">
               <a:rPr lang="es-ES" smtClean="0"/>
-              <a:t>08/08/2015</a:t>
+              <a:t>30/08/2015</a:t>
             </a:fld>
             <a:endParaRPr lang="es-ES"/>
           </a:p>
@@ -1189,11 +1189,7 @@
             </a:r>
             <a:r>
               <a:rPr lang="es-ES" sz="900" dirty="0" smtClean="0"/>
-              <a:t>raducida </a:t>
-            </a:r>
-            <a:r>
-              <a:rPr lang="es-ES" sz="900" dirty="0" smtClean="0"/>
-              <a:t>en</a:t>
+              <a:t>raducida en</a:t>
             </a:r>
             <a:endParaRPr lang="es-ES" sz="900" dirty="0"/>
           </a:p>
@@ -1284,12 +1280,20 @@
           <a:p>
             <a:pPr algn="ctr"/>
             <a:r>
+              <a:rPr lang="es-ES" sz="1050" dirty="0">
+                <a:solidFill>
+                  <a:schemeClr val="bg1"/>
+                </a:solidFill>
+              </a:rPr>
+              <a:t>m</a:t>
+            </a:r>
+            <a:r>
               <a:rPr lang="es-ES" sz="1050" dirty="0" smtClean="0">
                 <a:solidFill>
                   <a:schemeClr val="bg1"/>
                 </a:solidFill>
               </a:rPr>
-              <a:t>Multiculturalidad</a:t>
+              <a:t>ulticulturalidad</a:t>
             </a:r>
             <a:endParaRPr lang="es-ES" sz="1050" dirty="0">
               <a:solidFill>
@@ -1455,12 +1459,28 @@
           <a:p>
             <a:pPr algn="ctr"/>
             <a:r>
+              <a:rPr lang="es-ES" sz="900" dirty="0">
+                <a:solidFill>
+                  <a:schemeClr val="tx1"/>
+                </a:solidFill>
+              </a:rPr>
+              <a:t>e</a:t>
+            </a:r>
+            <a:r>
               <a:rPr lang="es-ES" sz="900" dirty="0" smtClean="0">
                 <a:solidFill>
                   <a:schemeClr val="tx1"/>
                 </a:solidFill>
               </a:rPr>
-              <a:t>Existen herencias múltiples</a:t>
+              <a:t>xisten </a:t>
+            </a:r>
+            <a:r>
+              <a:rPr lang="es-ES" sz="900" dirty="0" smtClean="0">
+                <a:solidFill>
+                  <a:schemeClr val="tx1"/>
+                </a:solidFill>
+              </a:rPr>
+              <a:t>herencias múltiples</a:t>
             </a:r>
             <a:endParaRPr lang="es-ES" sz="900" dirty="0">
               <a:solidFill>
@@ -1516,13 +1536,26 @@
               <a:buChar char="•"/>
             </a:pPr>
             <a:r>
+              <a:rPr lang="es-ES" sz="900" dirty="0">
+                <a:solidFill>
+                  <a:schemeClr val="tx1"/>
+                </a:solidFill>
+              </a:rPr>
+              <a:t>r</a:t>
+            </a:r>
+            <a:r>
               <a:rPr lang="es-ES" sz="900" dirty="0" smtClean="0">
                 <a:solidFill>
                   <a:schemeClr val="tx1"/>
                 </a:solidFill>
               </a:rPr>
-              <a:t>Raza</a:t>
-            </a:r>
+              <a:t>aza</a:t>
+            </a:r>
+            <a:endParaRPr lang="es-ES" sz="900" dirty="0" smtClean="0">
+              <a:solidFill>
+                <a:schemeClr val="tx1"/>
+              </a:solidFill>
+            </a:endParaRPr>
           </a:p>
           <a:p>
             <a:pPr marL="171450" indent="-171450">
@@ -1530,12 +1563,28 @@
               <a:buChar char="•"/>
             </a:pPr>
             <a:r>
+              <a:rPr lang="es-ES" sz="900" dirty="0">
+                <a:solidFill>
+                  <a:schemeClr val="tx1"/>
+                </a:solidFill>
+              </a:rPr>
+              <a:t>o</a:t>
+            </a:r>
+            <a:r>
               <a:rPr lang="es-ES" sz="900" dirty="0" smtClean="0">
                 <a:solidFill>
                   <a:schemeClr val="tx1"/>
                 </a:solidFill>
               </a:rPr>
-              <a:t>Organización sociopolítica</a:t>
+              <a:t>rganización </a:t>
+            </a:r>
+            <a:r>
+              <a:rPr lang="es-ES" sz="900" dirty="0" smtClean="0">
+                <a:solidFill>
+                  <a:schemeClr val="tx1"/>
+                </a:solidFill>
+              </a:rPr>
+              <a:t>sociopolítica</a:t>
             </a:r>
           </a:p>
           <a:p>
@@ -1544,12 +1593,28 @@
               <a:buChar char="•"/>
             </a:pPr>
             <a:r>
+              <a:rPr lang="es-ES" sz="900" dirty="0">
+                <a:solidFill>
+                  <a:schemeClr val="tx1"/>
+                </a:solidFill>
+              </a:rPr>
+              <a:t>o</a:t>
+            </a:r>
+            <a:r>
               <a:rPr lang="es-ES" sz="900" dirty="0" smtClean="0">
                 <a:solidFill>
                   <a:schemeClr val="tx1"/>
                 </a:solidFill>
               </a:rPr>
-              <a:t>Orientaciones espirituales y filosóficas</a:t>
+              <a:t>rientaciones </a:t>
+            </a:r>
+            <a:r>
+              <a:rPr lang="es-ES" sz="900" dirty="0" smtClean="0">
+                <a:solidFill>
+                  <a:schemeClr val="tx1"/>
+                </a:solidFill>
+              </a:rPr>
+              <a:t>espirituales y filosóficas</a:t>
             </a:r>
           </a:p>
           <a:p>
@@ -1558,12 +1623,28 @@
               <a:buChar char="•"/>
             </a:pPr>
             <a:r>
+              <a:rPr lang="es-ES" sz="900" dirty="0">
+                <a:solidFill>
+                  <a:schemeClr val="tx1"/>
+                </a:solidFill>
+              </a:rPr>
+              <a:t>m</a:t>
+            </a:r>
+            <a:r>
               <a:rPr lang="es-ES" sz="900" dirty="0" smtClean="0">
                 <a:solidFill>
                   <a:schemeClr val="tx1"/>
                 </a:solidFill>
               </a:rPr>
-              <a:t>Modos de vida</a:t>
+              <a:t>odos </a:t>
+            </a:r>
+            <a:r>
+              <a:rPr lang="es-ES" sz="900" dirty="0" smtClean="0">
+                <a:solidFill>
+                  <a:schemeClr val="tx1"/>
+                </a:solidFill>
+              </a:rPr>
+              <a:t>de vida</a:t>
             </a:r>
           </a:p>
           <a:p>
@@ -1572,12 +1653,28 @@
               <a:buChar char="•"/>
             </a:pPr>
             <a:r>
+              <a:rPr lang="es-ES" sz="900" dirty="0">
+                <a:solidFill>
+                  <a:schemeClr val="tx1"/>
+                </a:solidFill>
+              </a:rPr>
+              <a:t>t</a:t>
+            </a:r>
+            <a:r>
               <a:rPr lang="es-ES" sz="900" dirty="0" smtClean="0">
                 <a:solidFill>
                   <a:schemeClr val="tx1"/>
                 </a:solidFill>
               </a:rPr>
-              <a:t>Tradiciones culturales</a:t>
+              <a:t>radiciones </a:t>
+            </a:r>
+            <a:r>
+              <a:rPr lang="es-ES" sz="900" dirty="0" smtClean="0">
+                <a:solidFill>
+                  <a:schemeClr val="tx1"/>
+                </a:solidFill>
+              </a:rPr>
+              <a:t>culturales</a:t>
             </a:r>
             <a:endParaRPr lang="es-ES" sz="900" dirty="0">
               <a:solidFill>
@@ -1630,12 +1727,28 @@
           <a:p>
             <a:pPr algn="ctr"/>
             <a:r>
+              <a:rPr lang="es-ES" sz="900" dirty="0">
+                <a:solidFill>
+                  <a:schemeClr val="tx1"/>
+                </a:solidFill>
+              </a:rPr>
+              <a:t>c</a:t>
+            </a:r>
+            <a:r>
               <a:rPr lang="es-ES" sz="900" dirty="0" smtClean="0">
                 <a:solidFill>
                   <a:schemeClr val="tx1"/>
                 </a:solidFill>
               </a:rPr>
-              <a:t>Cultura occidental</a:t>
+              <a:t>ultura </a:t>
+            </a:r>
+            <a:r>
+              <a:rPr lang="es-ES" sz="900" dirty="0" smtClean="0">
+                <a:solidFill>
+                  <a:schemeClr val="tx1"/>
+                </a:solidFill>
+              </a:rPr>
+              <a:t>occidental</a:t>
             </a:r>
             <a:endParaRPr lang="es-ES" sz="900" dirty="0">
               <a:solidFill>
@@ -1782,11 +1895,7 @@
             </a:r>
             <a:r>
               <a:rPr lang="es-ES" sz="900" dirty="0" smtClean="0"/>
-              <a:t>rovenientes </a:t>
-            </a:r>
-            <a:r>
-              <a:rPr lang="es-ES" sz="900" dirty="0" smtClean="0"/>
-              <a:t>de</a:t>
+              <a:t>rovenientes de</a:t>
             </a:r>
             <a:endParaRPr lang="es-ES" sz="900" dirty="0"/>
           </a:p>
@@ -1913,13 +2022,26 @@
               <a:buChar char="•"/>
             </a:pPr>
             <a:r>
+              <a:rPr lang="es-ES" sz="900" dirty="0">
+                <a:solidFill>
+                  <a:schemeClr val="tx1"/>
+                </a:solidFill>
+              </a:rPr>
+              <a:t>g</a:t>
+            </a:r>
+            <a:r>
               <a:rPr lang="es-ES" sz="900" dirty="0" smtClean="0">
                 <a:solidFill>
                   <a:schemeClr val="tx1"/>
                 </a:solidFill>
               </a:rPr>
-              <a:t>Grecorromana</a:t>
-            </a:r>
+              <a:t>recorromana</a:t>
+            </a:r>
+            <a:endParaRPr lang="es-ES" sz="900" dirty="0" smtClean="0">
+              <a:solidFill>
+                <a:schemeClr val="tx1"/>
+              </a:solidFill>
+            </a:endParaRPr>
           </a:p>
           <a:p>
             <a:pPr marL="171450" indent="-171450">
@@ -1927,13 +2049,26 @@
               <a:buChar char="•"/>
             </a:pPr>
             <a:r>
+              <a:rPr lang="es-ES" sz="900" dirty="0">
+                <a:solidFill>
+                  <a:schemeClr val="tx1"/>
+                </a:solidFill>
+              </a:rPr>
+              <a:t>g</a:t>
+            </a:r>
+            <a:r>
               <a:rPr lang="es-ES" sz="900" dirty="0" smtClean="0">
                 <a:solidFill>
                   <a:schemeClr val="tx1"/>
                 </a:solidFill>
               </a:rPr>
-              <a:t>Germánica</a:t>
-            </a:r>
+              <a:t>ermánica</a:t>
+            </a:r>
+            <a:endParaRPr lang="es-ES" sz="900" dirty="0" smtClean="0">
+              <a:solidFill>
+                <a:schemeClr val="tx1"/>
+              </a:solidFill>
+            </a:endParaRPr>
           </a:p>
           <a:p>
             <a:pPr marL="171450" indent="-171450">
@@ -1946,7 +2081,7 @@
                   <a:schemeClr val="tx1"/>
                 </a:solidFill>
               </a:rPr>
-              <a:t>Hebreo-cristiana</a:t>
+              <a:t>hebreo-cristiana</a:t>
             </a:r>
             <a:endParaRPr lang="es-ES" sz="900" dirty="0">
               <a:solidFill>
@@ -2252,7 +2387,7 @@
                   <a:schemeClr val="bg1"/>
                 </a:solidFill>
               </a:rPr>
-              <a:t>Integración</a:t>
+              <a:t>integración</a:t>
             </a:r>
             <a:endParaRPr lang="es-ES" sz="1050" dirty="0">
               <a:solidFill>
@@ -2416,12 +2551,20 @@
           <a:p>
             <a:pPr algn="ctr"/>
             <a:r>
+              <a:rPr lang="es-ES" sz="900" dirty="0">
+                <a:solidFill>
+                  <a:schemeClr val="tx1"/>
+                </a:solidFill>
+              </a:rPr>
+              <a:t>a</a:t>
+            </a:r>
+            <a:r>
               <a:rPr lang="es-ES" sz="900" dirty="0" smtClean="0">
                 <a:solidFill>
                   <a:schemeClr val="tx1"/>
                 </a:solidFill>
               </a:rPr>
-              <a:t>Asimilación</a:t>
+              <a:t>similación</a:t>
             </a:r>
             <a:endParaRPr lang="es-ES" sz="900" dirty="0">
               <a:solidFill>
@@ -2544,12 +2687,20 @@
           <a:p>
             <a:pPr algn="ctr"/>
             <a:r>
+              <a:rPr lang="es-ES" sz="1050" dirty="0">
+                <a:solidFill>
+                  <a:schemeClr val="bg1"/>
+                </a:solidFill>
+              </a:rPr>
+              <a:t>s</a:t>
+            </a:r>
+            <a:r>
               <a:rPr lang="es-ES" sz="1050" dirty="0" smtClean="0">
                 <a:solidFill>
                   <a:schemeClr val="bg1"/>
                 </a:solidFill>
               </a:rPr>
-              <a:t>Segregación</a:t>
+              <a:t>egregación</a:t>
             </a:r>
             <a:endParaRPr lang="es-ES" sz="1050" dirty="0">
               <a:solidFill>
@@ -2715,13 +2866,26 @@
               <a:buChar char="•"/>
             </a:pPr>
             <a:r>
+              <a:rPr lang="es-ES" sz="900" dirty="0">
+                <a:solidFill>
+                  <a:schemeClr val="tx1"/>
+                </a:solidFill>
+              </a:rPr>
+              <a:t>r</a:t>
+            </a:r>
+            <a:r>
               <a:rPr lang="es-ES" sz="900" dirty="0" smtClean="0">
                 <a:solidFill>
                   <a:schemeClr val="tx1"/>
                 </a:solidFill>
               </a:rPr>
-              <a:t>Racismo</a:t>
-            </a:r>
+              <a:t>acismo</a:t>
+            </a:r>
+            <a:endParaRPr lang="es-ES" sz="900" dirty="0" smtClean="0">
+              <a:solidFill>
+                <a:schemeClr val="tx1"/>
+              </a:solidFill>
+            </a:endParaRPr>
           </a:p>
           <a:p>
             <a:pPr marL="171450" indent="-171450" algn="ctr">
@@ -2729,12 +2893,20 @@
               <a:buChar char="•"/>
             </a:pPr>
             <a:r>
+              <a:rPr lang="es-ES" sz="900" dirty="0">
+                <a:solidFill>
+                  <a:schemeClr val="tx1"/>
+                </a:solidFill>
+              </a:rPr>
+              <a:t>x</a:t>
+            </a:r>
+            <a:r>
               <a:rPr lang="es-ES" sz="900" dirty="0" smtClean="0">
                 <a:solidFill>
                   <a:schemeClr val="tx1"/>
                 </a:solidFill>
               </a:rPr>
-              <a:t>Xenofobia</a:t>
+              <a:t>enofobia</a:t>
             </a:r>
             <a:endParaRPr lang="es-ES" sz="900" dirty="0">
               <a:solidFill>
@@ -2787,12 +2959,20 @@
           <a:p>
             <a:pPr algn="ctr"/>
             <a:r>
+              <a:rPr lang="es-ES" sz="900" dirty="0">
+                <a:solidFill>
+                  <a:schemeClr val="tx1"/>
+                </a:solidFill>
+              </a:rPr>
+              <a:t>m</a:t>
+            </a:r>
+            <a:r>
               <a:rPr lang="es-ES" sz="900" dirty="0" smtClean="0">
                 <a:solidFill>
                   <a:schemeClr val="tx1"/>
                 </a:solidFill>
               </a:rPr>
-              <a:t>Mecanismos</a:t>
+              <a:t>ecanismos</a:t>
             </a:r>
             <a:endParaRPr lang="es-ES" sz="900" dirty="0">
               <a:solidFill>
@@ -2848,13 +3028,26 @@
               <a:buChar char="•"/>
             </a:pPr>
             <a:r>
+              <a:rPr lang="es-ES" sz="900" dirty="0">
+                <a:solidFill>
+                  <a:schemeClr val="tx1"/>
+                </a:solidFill>
+              </a:rPr>
+              <a:t>t</a:t>
+            </a:r>
+            <a:r>
               <a:rPr lang="es-ES" sz="900" dirty="0" smtClean="0">
                 <a:solidFill>
                   <a:schemeClr val="tx1"/>
                 </a:solidFill>
               </a:rPr>
-              <a:t>Tratados</a:t>
-            </a:r>
+              <a:t>ratados</a:t>
+            </a:r>
+            <a:endParaRPr lang="es-ES" sz="900" dirty="0" smtClean="0">
+              <a:solidFill>
+                <a:schemeClr val="tx1"/>
+              </a:solidFill>
+            </a:endParaRPr>
           </a:p>
           <a:p>
             <a:pPr marL="171450" indent="-171450" algn="ctr">
@@ -2862,13 +3055,26 @@
               <a:buChar char="•"/>
             </a:pPr>
             <a:r>
+              <a:rPr lang="es-ES" sz="900" dirty="0">
+                <a:solidFill>
+                  <a:schemeClr val="tx1"/>
+                </a:solidFill>
+              </a:rPr>
+              <a:t>d</a:t>
+            </a:r>
+            <a:r>
               <a:rPr lang="es-ES" sz="900" dirty="0" smtClean="0">
                 <a:solidFill>
                   <a:schemeClr val="tx1"/>
                 </a:solidFill>
               </a:rPr>
-              <a:t>Declaraciones</a:t>
-            </a:r>
+              <a:t>eclaraciones</a:t>
+            </a:r>
+            <a:endParaRPr lang="es-ES" sz="900" dirty="0" smtClean="0">
+              <a:solidFill>
+                <a:schemeClr val="tx1"/>
+              </a:solidFill>
+            </a:endParaRPr>
           </a:p>
           <a:p>
             <a:pPr marL="171450" indent="-171450" algn="ctr">
@@ -2876,13 +3082,26 @@
               <a:buChar char="•"/>
             </a:pPr>
             <a:r>
+              <a:rPr lang="es-ES" sz="900" dirty="0">
+                <a:solidFill>
+                  <a:schemeClr val="tx1"/>
+                </a:solidFill>
+              </a:rPr>
+              <a:t>c</a:t>
+            </a:r>
+            <a:r>
               <a:rPr lang="es-ES" sz="900" dirty="0" smtClean="0">
                 <a:solidFill>
                   <a:schemeClr val="tx1"/>
                 </a:solidFill>
               </a:rPr>
-              <a:t>Constituciones</a:t>
-            </a:r>
+              <a:t>onstituciones</a:t>
+            </a:r>
+            <a:endParaRPr lang="es-ES" sz="900" dirty="0" smtClean="0">
+              <a:solidFill>
+                <a:schemeClr val="tx1"/>
+              </a:solidFill>
+            </a:endParaRPr>
           </a:p>
           <a:p>
             <a:pPr marL="171450" indent="-171450" algn="ctr">
@@ -2890,13 +3109,26 @@
               <a:buChar char="•"/>
             </a:pPr>
             <a:r>
+              <a:rPr lang="es-ES" sz="900" dirty="0">
+                <a:solidFill>
+                  <a:schemeClr val="tx1"/>
+                </a:solidFill>
+              </a:rPr>
+              <a:t>a</a:t>
+            </a:r>
+            <a:r>
               <a:rPr lang="es-ES" sz="900" dirty="0" smtClean="0">
                 <a:solidFill>
                   <a:schemeClr val="tx1"/>
                 </a:solidFill>
               </a:rPr>
-              <a:t>Acuerdos</a:t>
-            </a:r>
+              <a:t>cuerdos</a:t>
+            </a:r>
+            <a:endParaRPr lang="es-ES" sz="900" dirty="0" smtClean="0">
+              <a:solidFill>
+                <a:schemeClr val="tx1"/>
+              </a:solidFill>
+            </a:endParaRPr>
           </a:p>
         </p:txBody>
       </p:sp>
@@ -3085,12 +3317,28 @@
           <a:p>
             <a:pPr algn="ctr"/>
             <a:r>
+              <a:rPr lang="es-ES" sz="900" dirty="0">
+                <a:solidFill>
+                  <a:schemeClr val="tx1"/>
+                </a:solidFill>
+              </a:rPr>
+              <a:t>p</a:t>
+            </a:r>
+            <a:r>
               <a:rPr lang="es-ES" sz="900" dirty="0" smtClean="0">
                 <a:solidFill>
                   <a:schemeClr val="tx1"/>
                 </a:solidFill>
               </a:rPr>
-              <a:t>Personajes relevantes</a:t>
+              <a:t>ersonajes </a:t>
+            </a:r>
+            <a:r>
+              <a:rPr lang="es-ES" sz="900" dirty="0" smtClean="0">
+                <a:solidFill>
+                  <a:schemeClr val="tx1"/>
+                </a:solidFill>
+              </a:rPr>
+              <a:t>relevantes</a:t>
             </a:r>
             <a:endParaRPr lang="es-ES" sz="900" dirty="0">
               <a:solidFill>
@@ -3423,12 +3671,20 @@
           <a:p>
             <a:pPr algn="ctr"/>
             <a:r>
+              <a:rPr lang="es-ES" sz="1050" dirty="0">
+                <a:solidFill>
+                  <a:schemeClr val="bg1"/>
+                </a:solidFill>
+              </a:rPr>
+              <a:t>m</a:t>
+            </a:r>
+            <a:r>
               <a:rPr lang="es-ES" sz="1050" dirty="0" smtClean="0">
                 <a:solidFill>
                   <a:schemeClr val="bg1"/>
                 </a:solidFill>
               </a:rPr>
-              <a:t>Mestizaje</a:t>
+              <a:t>estizaje</a:t>
             </a:r>
             <a:endParaRPr lang="es-ES" sz="1050" dirty="0">
               <a:solidFill>
@@ -3507,11 +3763,7 @@
             </a:r>
             <a:r>
               <a:rPr lang="es-ES" sz="900" dirty="0" smtClean="0"/>
-              <a:t>e </a:t>
-            </a:r>
-            <a:r>
-              <a:rPr lang="es-ES" sz="900" dirty="0" smtClean="0"/>
-              <a:t>refleja en</a:t>
+              <a:t>e refleja en</a:t>
             </a:r>
             <a:endParaRPr lang="es-ES" sz="900" dirty="0"/>
           </a:p>
@@ -3602,12 +3854,28 @@
           <a:p>
             <a:pPr algn="ctr"/>
             <a:r>
+              <a:rPr lang="es-ES" sz="900" dirty="0">
+                <a:solidFill>
+                  <a:schemeClr val="tx1"/>
+                </a:solidFill>
+              </a:rPr>
+              <a:t>d</a:t>
+            </a:r>
+            <a:r>
               <a:rPr lang="es-ES" sz="900" dirty="0" smtClean="0">
                 <a:solidFill>
                   <a:schemeClr val="tx1"/>
                 </a:solidFill>
               </a:rPr>
-              <a:t>Diferentes etnias, cada una con sus valores culturales</a:t>
+              <a:t>iferentes </a:t>
+            </a:r>
+            <a:r>
+              <a:rPr lang="es-ES" sz="900" dirty="0" smtClean="0">
+                <a:solidFill>
+                  <a:schemeClr val="tx1"/>
+                </a:solidFill>
+              </a:rPr>
+              <a:t>etnias, cada una con sus valores culturales</a:t>
             </a:r>
             <a:endParaRPr lang="es-ES" sz="900" dirty="0">
               <a:solidFill>
@@ -3663,13 +3931,26 @@
               <a:buChar char="•"/>
             </a:pPr>
             <a:r>
+              <a:rPr lang="es-ES" sz="900" dirty="0">
+                <a:solidFill>
+                  <a:schemeClr val="tx1"/>
+                </a:solidFill>
+              </a:rPr>
+              <a:t>i</a:t>
+            </a:r>
+            <a:r>
               <a:rPr lang="es-ES" sz="900" dirty="0" smtClean="0">
                 <a:solidFill>
                   <a:schemeClr val="tx1"/>
                 </a:solidFill>
               </a:rPr>
-              <a:t>Indígena</a:t>
-            </a:r>
+              <a:t>ndígena</a:t>
+            </a:r>
+            <a:endParaRPr lang="es-ES" sz="900" dirty="0" smtClean="0">
+              <a:solidFill>
+                <a:schemeClr val="tx1"/>
+              </a:solidFill>
+            </a:endParaRPr>
           </a:p>
           <a:p>
             <a:pPr marL="171450" indent="-171450" algn="ctr">
@@ -3696,8 +3977,13 @@
                   <a:schemeClr val="tx1"/>
                 </a:solidFill>
               </a:rPr>
-              <a:t>Raizal</a:t>
-            </a:r>
+              <a:t>raizal</a:t>
+            </a:r>
+            <a:endParaRPr lang="es-ES" sz="900" dirty="0" smtClean="0">
+              <a:solidFill>
+                <a:schemeClr val="tx1"/>
+              </a:solidFill>
+            </a:endParaRPr>
           </a:p>
           <a:p>
             <a:pPr marL="171450" indent="-171450" algn="ctr">
@@ -3705,12 +3991,20 @@
               <a:buChar char="•"/>
             </a:pPr>
             <a:r>
+              <a:rPr lang="es-ES" sz="900" dirty="0" err="1">
+                <a:solidFill>
+                  <a:schemeClr val="tx1"/>
+                </a:solidFill>
+              </a:rPr>
+              <a:t>p</a:t>
+            </a:r>
+            <a:r>
               <a:rPr lang="es-ES" sz="900" dirty="0" err="1" smtClean="0">
                 <a:solidFill>
                   <a:schemeClr val="tx1"/>
                 </a:solidFill>
               </a:rPr>
-              <a:t>Palenquero</a:t>
+              <a:t>alenquero</a:t>
             </a:r>
             <a:endParaRPr lang="es-ES" sz="900" dirty="0">
               <a:solidFill>
@@ -3724,13 +4018,26 @@
               <a:buChar char="•"/>
             </a:pPr>
             <a:r>
+              <a:rPr lang="es-ES" sz="900" dirty="0">
+                <a:solidFill>
+                  <a:schemeClr val="tx1"/>
+                </a:solidFill>
+              </a:rPr>
+              <a:t>a</a:t>
+            </a:r>
+            <a:r>
               <a:rPr lang="es-ES" sz="900" dirty="0" smtClean="0">
                 <a:solidFill>
                   <a:schemeClr val="tx1"/>
                 </a:solidFill>
               </a:rPr>
-              <a:t>Afrodescendiente</a:t>
-            </a:r>
+              <a:t>frodescendiente</a:t>
+            </a:r>
+            <a:endParaRPr lang="es-ES" sz="900" dirty="0" smtClean="0">
+              <a:solidFill>
+                <a:schemeClr val="tx1"/>
+              </a:solidFill>
+            </a:endParaRPr>
           </a:p>
           <a:p>
             <a:pPr marL="171450" indent="-171450" algn="ctr">
@@ -3738,12 +4045,20 @@
               <a:buChar char="•"/>
             </a:pPr>
             <a:r>
+              <a:rPr lang="es-ES" sz="900" smtClean="0">
+                <a:solidFill>
+                  <a:schemeClr val="tx1"/>
+                </a:solidFill>
+              </a:rPr>
+              <a:t>personas </a:t>
+            </a:r>
+            <a:r>
               <a:rPr lang="es-ES" sz="900" dirty="0" smtClean="0">
                 <a:solidFill>
                   <a:schemeClr val="tx1"/>
                 </a:solidFill>
               </a:rPr>
-              <a:t>Personas sin pertenencia </a:t>
+              <a:t>sin pertenencia </a:t>
             </a:r>
             <a:r>
               <a:rPr lang="es-ES" sz="900" dirty="0">
@@ -4032,12 +4347,20 @@
           <a:p>
             <a:pPr algn="ctr"/>
             <a:r>
+              <a:rPr lang="es-ES" sz="1050" dirty="0">
+                <a:solidFill>
+                  <a:schemeClr val="bg1"/>
+                </a:solidFill>
+              </a:rPr>
+              <a:t>i</a:t>
+            </a:r>
+            <a:r>
               <a:rPr lang="es-ES" sz="1050" dirty="0" smtClean="0">
                 <a:solidFill>
                   <a:schemeClr val="bg1"/>
                 </a:solidFill>
               </a:rPr>
-              <a:t>Interculturalidad</a:t>
+              <a:t>nterculturalidad</a:t>
             </a:r>
             <a:endParaRPr lang="es-ES" sz="1050" dirty="0">
               <a:solidFill>
@@ -4160,12 +4483,28 @@
           <a:p>
             <a:pPr algn="ctr"/>
             <a:r>
+              <a:rPr lang="es-ES" sz="900" dirty="0">
+                <a:solidFill>
+                  <a:schemeClr val="tx1"/>
+                </a:solidFill>
+              </a:rPr>
+              <a:t>l</a:t>
+            </a:r>
+            <a:r>
               <a:rPr lang="es-ES" sz="900" dirty="0" smtClean="0">
                 <a:solidFill>
                   <a:schemeClr val="tx1"/>
                 </a:solidFill>
               </a:rPr>
-              <a:t>Las culturas se relacionan y comunican</a:t>
+              <a:t>as </a:t>
+            </a:r>
+            <a:r>
+              <a:rPr lang="es-ES" sz="900" dirty="0" smtClean="0">
+                <a:solidFill>
+                  <a:schemeClr val="tx1"/>
+                </a:solidFill>
+              </a:rPr>
+              <a:t>culturas se relacionan y comunican</a:t>
             </a:r>
             <a:endParaRPr lang="es-ES" sz="900" dirty="0">
               <a:solidFill>
@@ -4255,12 +4594,28 @@
           <a:p>
             <a:pPr algn="ctr"/>
             <a:r>
+              <a:rPr lang="es-ES" sz="900" dirty="0">
+                <a:solidFill>
+                  <a:schemeClr val="tx1"/>
+                </a:solidFill>
+              </a:rPr>
+              <a:t>c</a:t>
+            </a:r>
+            <a:r>
               <a:rPr lang="es-ES" sz="900" dirty="0" smtClean="0">
                 <a:solidFill>
                   <a:schemeClr val="tx1"/>
                 </a:solidFill>
               </a:rPr>
-              <a:t>Cultura oriental</a:t>
+              <a:t>ultura </a:t>
+            </a:r>
+            <a:r>
+              <a:rPr lang="es-ES" sz="900" dirty="0" smtClean="0">
+                <a:solidFill>
+                  <a:schemeClr val="tx1"/>
+                </a:solidFill>
+              </a:rPr>
+              <a:t>oriental</a:t>
             </a:r>
             <a:endParaRPr lang="es-ES" sz="900" dirty="0">
               <a:solidFill>
@@ -4348,8 +4703,9 @@
             </a:pPr>
             <a:r>
               <a:rPr lang="es-ES" sz="900" dirty="0" smtClean="0"/>
-              <a:t>Árabe</a:t>
-            </a:r>
+              <a:t>árabe</a:t>
+            </a:r>
+            <a:endParaRPr lang="es-ES" sz="900" dirty="0" smtClean="0"/>
           </a:p>
           <a:p>
             <a:pPr marL="171450" indent="-171450">
@@ -4357,9 +4713,14 @@
               <a:buChar char="•"/>
             </a:pPr>
             <a:r>
+              <a:rPr lang="es-ES" sz="900" dirty="0"/>
+              <a:t>c</a:t>
+            </a:r>
+            <a:r>
               <a:rPr lang="es-ES" sz="900" dirty="0" smtClean="0"/>
-              <a:t>China</a:t>
-            </a:r>
+              <a:t>hina</a:t>
+            </a:r>
+            <a:endParaRPr lang="es-ES" sz="900" dirty="0" smtClean="0"/>
           </a:p>
           <a:p>
             <a:pPr marL="171450" indent="-171450">
@@ -4367,9 +4728,14 @@
               <a:buChar char="•"/>
             </a:pPr>
             <a:r>
+              <a:rPr lang="es-ES" sz="900" dirty="0"/>
+              <a:t>i</a:t>
+            </a:r>
+            <a:r>
               <a:rPr lang="es-ES" sz="900" dirty="0" smtClean="0"/>
-              <a:t>India</a:t>
-            </a:r>
+              <a:t>ndia</a:t>
+            </a:r>
+            <a:endParaRPr lang="es-ES" sz="900" dirty="0" smtClean="0"/>
           </a:p>
           <a:p>
             <a:pPr marL="171450" indent="-171450">
@@ -4377,8 +4743,12 @@
               <a:buChar char="•"/>
             </a:pPr>
             <a:r>
+              <a:rPr lang="es-ES" sz="900" dirty="0"/>
+              <a:t>j</a:t>
+            </a:r>
+            <a:r>
               <a:rPr lang="es-ES" sz="900" dirty="0" smtClean="0"/>
-              <a:t>Japonesa</a:t>
+              <a:t>aponesa</a:t>
             </a:r>
             <a:endParaRPr lang="es-ES" sz="900" dirty="0"/>
           </a:p>
@@ -4610,12 +4980,28 @@
           <a:lstStyle/>
           <a:p>
             <a:r>
+              <a:rPr lang="es-ES" sz="900" dirty="0">
+                <a:solidFill>
+                  <a:schemeClr val="tx1"/>
+                </a:solidFill>
+              </a:rPr>
+              <a:t>a</a:t>
+            </a:r>
+            <a:r>
               <a:rPr lang="es-ES" sz="900" dirty="0" smtClean="0">
                 <a:solidFill>
                   <a:schemeClr val="tx1"/>
                 </a:solidFill>
               </a:rPr>
-              <a:t>Adopción de valores</a:t>
+              <a:t>dopción </a:t>
+            </a:r>
+            <a:r>
+              <a:rPr lang="es-ES" sz="900" dirty="0" smtClean="0">
+                <a:solidFill>
+                  <a:schemeClr val="tx1"/>
+                </a:solidFill>
+              </a:rPr>
+              <a:t>de valores</a:t>
             </a:r>
             <a:endParaRPr lang="es-ES" sz="900" dirty="0">
               <a:solidFill>
@@ -4853,15 +5239,7 @@
                   <a:schemeClr val="tx1"/>
                 </a:solidFill>
               </a:rPr>
-              <a:t>Constitución Política de Colombia, </a:t>
-            </a:r>
-            <a:r>
-              <a:rPr lang="es-ES" sz="900" dirty="0" smtClean="0">
-                <a:solidFill>
-                  <a:schemeClr val="tx1"/>
-                </a:solidFill>
-              </a:rPr>
-              <a:t>1991</a:t>
+              <a:t>Constitución Política de Colombia, 1991</a:t>
             </a:r>
             <a:endParaRPr lang="es-ES" sz="900" dirty="0">
               <a:solidFill>
@@ -5018,12 +5396,28 @@
           <a:lstStyle/>
           <a:p>
             <a:r>
+              <a:rPr lang="es-ES" sz="900" dirty="0">
+                <a:solidFill>
+                  <a:schemeClr val="tx1"/>
+                </a:solidFill>
+              </a:rPr>
+              <a:t>m</a:t>
+            </a:r>
+            <a:r>
               <a:rPr lang="es-ES" sz="900" dirty="0" smtClean="0">
                 <a:solidFill>
                   <a:schemeClr val="tx1"/>
                 </a:solidFill>
               </a:rPr>
-              <a:t>Movimientos migratorios</a:t>
+              <a:t>ovimientos </a:t>
+            </a:r>
+            <a:r>
+              <a:rPr lang="es-ES" sz="900" dirty="0" smtClean="0">
+                <a:solidFill>
+                  <a:schemeClr val="tx1"/>
+                </a:solidFill>
+              </a:rPr>
+              <a:t>migratorios</a:t>
             </a:r>
             <a:endParaRPr lang="es-ES" sz="900" dirty="0">
               <a:solidFill>
@@ -5152,12 +5546,28 @@
           <a:p>
             <a:pPr algn="ctr"/>
             <a:r>
+              <a:rPr lang="es-ES" sz="900" dirty="0">
+                <a:solidFill>
+                  <a:schemeClr val="tx1"/>
+                </a:solidFill>
+              </a:rPr>
+              <a:t>b</a:t>
+            </a:r>
+            <a:r>
               <a:rPr lang="es-ES" sz="900" dirty="0" smtClean="0">
                 <a:solidFill>
                   <a:schemeClr val="tx1"/>
                 </a:solidFill>
               </a:rPr>
-              <a:t>Búsqueda de nuevas oportunidades</a:t>
+              <a:t>úsqueda </a:t>
+            </a:r>
+            <a:r>
+              <a:rPr lang="es-ES" sz="900" dirty="0" smtClean="0">
+                <a:solidFill>
+                  <a:schemeClr val="tx1"/>
+                </a:solidFill>
+              </a:rPr>
+              <a:t>de nuevas oportunidades</a:t>
             </a:r>
             <a:endParaRPr lang="es-ES" sz="900" dirty="0">
               <a:solidFill>
@@ -5284,12 +5694,28 @@
           <a:p>
             <a:pPr algn="ctr"/>
             <a:r>
+              <a:rPr lang="es-ES" sz="900" dirty="0">
+                <a:solidFill>
+                  <a:schemeClr val="tx1"/>
+                </a:solidFill>
+              </a:rPr>
+              <a:t>d</a:t>
+            </a:r>
+            <a:r>
               <a:rPr lang="es-ES" sz="900" dirty="0" smtClean="0">
                 <a:solidFill>
                   <a:schemeClr val="tx1"/>
                 </a:solidFill>
               </a:rPr>
-              <a:t>Desastres ambientales</a:t>
+              <a:t>esastres </a:t>
+            </a:r>
+            <a:r>
+              <a:rPr lang="es-ES" sz="900" dirty="0" smtClean="0">
+                <a:solidFill>
+                  <a:schemeClr val="tx1"/>
+                </a:solidFill>
+              </a:rPr>
+              <a:t>ambientales</a:t>
             </a:r>
             <a:endParaRPr lang="es-ES" sz="900" dirty="0">
               <a:solidFill>
@@ -5342,12 +5768,20 @@
           <a:p>
             <a:pPr algn="ctr"/>
             <a:r>
+              <a:rPr lang="es-ES" sz="900" dirty="0">
+                <a:solidFill>
+                  <a:schemeClr val="tx1"/>
+                </a:solidFill>
+              </a:rPr>
+              <a:t>g</a:t>
+            </a:r>
+            <a:r>
               <a:rPr lang="es-ES" sz="900" dirty="0" smtClean="0">
                 <a:solidFill>
                   <a:schemeClr val="tx1"/>
                 </a:solidFill>
               </a:rPr>
-              <a:t>Guerras</a:t>
+              <a:t>uerras</a:t>
             </a:r>
             <a:endParaRPr lang="es-ES" sz="900" dirty="0">
               <a:solidFill>
@@ -5732,7 +6166,7 @@
                   <a:schemeClr val="tx1"/>
                 </a:solidFill>
               </a:rPr>
-              <a:t>Melting</a:t>
+              <a:t>melting</a:t>
             </a:r>
             <a:r>
               <a:rPr lang="es-ES" sz="900" i="1" dirty="0" smtClean="0">
@@ -5803,12 +6237,28 @@
           <a:p>
             <a:pPr algn="ctr"/>
             <a:r>
+              <a:rPr lang="es-ES" sz="900" dirty="0">
+                <a:solidFill>
+                  <a:schemeClr val="tx1"/>
+                </a:solidFill>
+              </a:rPr>
+              <a:t>p</a:t>
+            </a:r>
+            <a:r>
               <a:rPr lang="es-ES" sz="900" dirty="0" smtClean="0">
                 <a:solidFill>
                   <a:schemeClr val="tx1"/>
                 </a:solidFill>
               </a:rPr>
-              <a:t>Pluralismo cultural</a:t>
+              <a:t>luralismo </a:t>
+            </a:r>
+            <a:r>
+              <a:rPr lang="es-ES" sz="900" dirty="0" smtClean="0">
+                <a:solidFill>
+                  <a:schemeClr val="tx1"/>
+                </a:solidFill>
+              </a:rPr>
+              <a:t>cultural</a:t>
             </a:r>
             <a:endParaRPr lang="es-ES" sz="900" dirty="0">
               <a:solidFill>
@@ -5895,12 +6345,28 @@
           <a:lstStyle/>
           <a:p>
             <a:r>
+              <a:rPr lang="es-ES" sz="900" dirty="0">
+                <a:solidFill>
+                  <a:schemeClr val="tx1"/>
+                </a:solidFill>
+              </a:rPr>
+              <a:t>n</a:t>
+            </a:r>
+            <a:r>
               <a:rPr lang="es-ES" sz="900" dirty="0" smtClean="0">
                 <a:solidFill>
                   <a:schemeClr val="tx1"/>
                 </a:solidFill>
               </a:rPr>
-              <a:t>Nuevas pautas culturales</a:t>
+              <a:t>uevas </a:t>
+            </a:r>
+            <a:r>
+              <a:rPr lang="es-ES" sz="900" dirty="0" smtClean="0">
+                <a:solidFill>
+                  <a:schemeClr val="tx1"/>
+                </a:solidFill>
+              </a:rPr>
+              <a:t>pautas culturales</a:t>
             </a:r>
             <a:endParaRPr lang="es-ES" sz="900" dirty="0">
               <a:solidFill>
@@ -6066,7 +6532,15 @@
                   <a:schemeClr val="tx1"/>
                 </a:solidFill>
               </a:rPr>
-              <a:t>Reconocimiento igualitario</a:t>
+              <a:t>reconocimiento </a:t>
+            </a:r>
+            <a:r>
+              <a:rPr lang="es-ES" sz="900" dirty="0" smtClean="0">
+                <a:solidFill>
+                  <a:schemeClr val="tx1"/>
+                </a:solidFill>
+              </a:rPr>
+              <a:t>igualitario</a:t>
             </a:r>
             <a:endParaRPr lang="es-ES" sz="900" dirty="0">
               <a:solidFill>
@@ -6336,13 +6810,26 @@
               <a:buChar char="•"/>
             </a:pPr>
             <a:r>
+              <a:rPr lang="es-ES" sz="900" dirty="0">
+                <a:solidFill>
+                  <a:schemeClr val="tx1"/>
+                </a:solidFill>
+              </a:rPr>
+              <a:t>d</a:t>
+            </a:r>
+            <a:r>
               <a:rPr lang="es-ES" sz="900" dirty="0" smtClean="0">
                 <a:solidFill>
                   <a:schemeClr val="tx1"/>
                 </a:solidFill>
               </a:rPr>
-              <a:t>Diversidad</a:t>
-            </a:r>
+              <a:t>iversidad</a:t>
+            </a:r>
+            <a:endParaRPr lang="es-ES" sz="900" dirty="0" smtClean="0">
+              <a:solidFill>
+                <a:schemeClr val="tx1"/>
+              </a:solidFill>
+            </a:endParaRPr>
           </a:p>
           <a:p>
             <a:pPr marL="171450" indent="-171450" algn="ctr">
@@ -6350,13 +6837,26 @@
               <a:buChar char="•"/>
             </a:pPr>
             <a:r>
+              <a:rPr lang="es-ES" sz="900" dirty="0">
+                <a:solidFill>
+                  <a:schemeClr val="tx1"/>
+                </a:solidFill>
+              </a:rPr>
+              <a:t>p</a:t>
+            </a:r>
+            <a:r>
               <a:rPr lang="es-ES" sz="900" dirty="0" smtClean="0">
                 <a:solidFill>
                   <a:schemeClr val="tx1"/>
                 </a:solidFill>
               </a:rPr>
-              <a:t>Pluralismo</a:t>
-            </a:r>
+              <a:t>luralismo</a:t>
+            </a:r>
+            <a:endParaRPr lang="es-ES" sz="900" dirty="0" smtClean="0">
+              <a:solidFill>
+                <a:schemeClr val="tx1"/>
+              </a:solidFill>
+            </a:endParaRPr>
           </a:p>
           <a:p>
             <a:pPr marL="171450" indent="-171450" algn="ctr">
@@ -6364,13 +6864,26 @@
               <a:buChar char="•"/>
             </a:pPr>
             <a:r>
+              <a:rPr lang="es-ES" sz="900" dirty="0">
+                <a:solidFill>
+                  <a:schemeClr val="tx1"/>
+                </a:solidFill>
+              </a:rPr>
+              <a:t>i</a:t>
+            </a:r>
+            <a:r>
               <a:rPr lang="es-ES" sz="900" dirty="0" smtClean="0">
                 <a:solidFill>
                   <a:schemeClr val="tx1"/>
                 </a:solidFill>
               </a:rPr>
-              <a:t>Identidad</a:t>
-            </a:r>
+              <a:t>dentidad</a:t>
+            </a:r>
+            <a:endParaRPr lang="es-ES" sz="900" dirty="0" smtClean="0">
+              <a:solidFill>
+                <a:schemeClr val="tx1"/>
+              </a:solidFill>
+            </a:endParaRPr>
           </a:p>
           <a:p>
             <a:pPr marL="171450" indent="-171450" algn="ctr">
@@ -6383,8 +6896,13 @@
                   <a:schemeClr val="tx1"/>
                 </a:solidFill>
               </a:rPr>
-              <a:t>Igualdad</a:t>
-            </a:r>
+              <a:t>igualdad</a:t>
+            </a:r>
+            <a:endParaRPr lang="es-ES" sz="900" dirty="0" smtClean="0">
+              <a:solidFill>
+                <a:schemeClr val="tx1"/>
+              </a:solidFill>
+            </a:endParaRPr>
           </a:p>
           <a:p>
             <a:pPr marL="171450" indent="-171450" algn="ctr">
@@ -6397,8 +6915,13 @@
                   <a:schemeClr val="tx1"/>
                 </a:solidFill>
               </a:rPr>
-              <a:t>Respeto</a:t>
-            </a:r>
+              <a:t>respeto</a:t>
+            </a:r>
+            <a:endParaRPr lang="es-ES" sz="900" dirty="0" smtClean="0">
+              <a:solidFill>
+                <a:schemeClr val="tx1"/>
+              </a:solidFill>
+            </a:endParaRPr>
           </a:p>
           <a:p>
             <a:pPr marL="171450" indent="-171450" algn="ctr">
@@ -6406,12 +6929,20 @@
               <a:buChar char="•"/>
             </a:pPr>
             <a:r>
+              <a:rPr lang="es-ES" sz="900" dirty="0">
+                <a:solidFill>
+                  <a:schemeClr val="tx1"/>
+                </a:solidFill>
+              </a:rPr>
+              <a:t>l</a:t>
+            </a:r>
+            <a:r>
               <a:rPr lang="es-ES" sz="900" dirty="0" smtClean="0">
                 <a:solidFill>
                   <a:schemeClr val="tx1"/>
                 </a:solidFill>
               </a:rPr>
-              <a:t>Libertad</a:t>
+              <a:t>ibertad</a:t>
             </a:r>
             <a:endParaRPr lang="es-ES" sz="900" dirty="0">
               <a:solidFill>

</xml_diff>